<commit_message>
præsentation - sprint slide updated
</commit_message>
<xml_diff>
--- a/Præsentation/Fremlæggelse.pptx
+++ b/Præsentation/Fremlæggelse.pptx
@@ -8,7 +8,7 @@
     <p:sldId id="256" r:id="rId2"/>
     <p:sldId id="257" r:id="rId3"/>
     <p:sldId id="258" r:id="rId4"/>
-    <p:sldId id="259" r:id="rId5"/>
+    <p:sldId id="266" r:id="rId5"/>
     <p:sldId id="260" r:id="rId6"/>
     <p:sldId id="261" r:id="rId7"/>
     <p:sldId id="262" r:id="rId8"/>
@@ -319,7 +319,7 @@
           <a:p>
             <a:fld id="{6AD6EE87-EBD5-4F12-A48A-63ACA297AC8F}" type="datetimeFigureOut">
               <a:rPr lang="en-US" smtClean="0"/>
-              <a:t>5/27/2016</a:t>
+              <a:t>6/1/2016</a:t>
             </a:fld>
             <a:endParaRPr lang="en-US" dirty="0"/>
           </a:p>
@@ -509,7 +509,7 @@
           <a:p>
             <a:fld id="{4CD73815-2707-4475-8F1A-B873CB631BB4}" type="datetimeFigureOut">
               <a:rPr lang="en-US" smtClean="0"/>
-              <a:t>5/27/2016</a:t>
+              <a:t>6/1/2016</a:t>
             </a:fld>
             <a:endParaRPr lang="en-US" dirty="0"/>
           </a:p>
@@ -689,7 +689,7 @@
           <a:p>
             <a:fld id="{2A4AFB99-0EAB-4182-AFF8-E214C82A68F6}" type="datetimeFigureOut">
               <a:rPr lang="en-US" smtClean="0"/>
-              <a:t>5/27/2016</a:t>
+              <a:t>6/1/2016</a:t>
             </a:fld>
             <a:endParaRPr lang="en-US" dirty="0"/>
           </a:p>
@@ -859,7 +859,7 @@
           <a:p>
             <a:fld id="{A5D3794B-289A-4A80-97D7-111025398D45}" type="datetimeFigureOut">
               <a:rPr lang="en-US" smtClean="0"/>
-              <a:t>5/27/2016</a:t>
+              <a:t>6/1/2016</a:t>
             </a:fld>
             <a:endParaRPr lang="en-US" dirty="0"/>
           </a:p>
@@ -1115,7 +1115,7 @@
           <a:p>
             <a:fld id="{5A61015F-7CC6-4D0A-9D87-873EA4C304CC}" type="datetimeFigureOut">
               <a:rPr lang="en-US" smtClean="0"/>
-              <a:t>5/27/2016</a:t>
+              <a:t>6/1/2016</a:t>
             </a:fld>
             <a:endParaRPr lang="en-US" dirty="0"/>
           </a:p>
@@ -1403,7 +1403,7 @@
           <a:p>
             <a:fld id="{93C6A301-0538-44EC-B09D-202E1042A48B}" type="datetimeFigureOut">
               <a:rPr lang="en-US" smtClean="0"/>
-              <a:t>5/27/2016</a:t>
+              <a:t>6/1/2016</a:t>
             </a:fld>
             <a:endParaRPr lang="en-US" dirty="0"/>
           </a:p>
@@ -1841,7 +1841,7 @@
           <a:p>
             <a:fld id="{D789574A-8875-45EF-8EA2-3CAA0F7ABC4C}" type="datetimeFigureOut">
               <a:rPr lang="en-US" smtClean="0"/>
-              <a:t>5/27/2016</a:t>
+              <a:t>6/1/2016</a:t>
             </a:fld>
             <a:endParaRPr lang="en-US" dirty="0"/>
           </a:p>
@@ -1959,7 +1959,7 @@
           <a:p>
             <a:fld id="{67EF4D4C-5367-4C26-9E2B-D8088D7FCA81}" type="datetimeFigureOut">
               <a:rPr lang="en-US" smtClean="0"/>
-              <a:t>5/27/2016</a:t>
+              <a:t>6/1/2016</a:t>
             </a:fld>
             <a:endParaRPr lang="en-US" dirty="0"/>
           </a:p>
@@ -2054,7 +2054,7 @@
           <a:p>
             <a:fld id="{56E91E96-98B0-4413-9547-46F3504108EF}" type="datetimeFigureOut">
               <a:rPr lang="en-US" smtClean="0"/>
-              <a:t>5/27/2016</a:t>
+              <a:t>6/1/2016</a:t>
             </a:fld>
             <a:endParaRPr lang="en-US" dirty="0"/>
           </a:p>
@@ -2410,7 +2410,7 @@
           <a:p>
             <a:fld id="{05C68B11-C5A8-448C-8CE9-B1A273C79CFC}" type="datetimeFigureOut">
               <a:rPr lang="en-US" smtClean="0"/>
-              <a:t>5/27/2016</a:t>
+              <a:t>6/1/2016</a:t>
             </a:fld>
             <a:endParaRPr lang="en-US" dirty="0"/>
           </a:p>
@@ -2726,7 +2726,7 @@
           <a:p>
             <a:fld id="{C7616CA0-919D-4A49-9C8A-62FDFB3A5183}" type="datetimeFigureOut">
               <a:rPr lang="en-US" smtClean="0"/>
-              <a:t>5/27/2016</a:t>
+              <a:t>6/1/2016</a:t>
             </a:fld>
             <a:endParaRPr lang="en-US" dirty="0"/>
           </a:p>
@@ -2960,7 +2960,7 @@
             <a:fld id="{90298CD5-6C1E-4009-B41F-6DF62E31D3BE}" type="datetimeFigureOut">
               <a:rPr lang="en-US" smtClean="0"/>
               <a:pPr/>
-              <a:t>5/27/2016</a:t>
+              <a:t>6/1/2016</a:t>
             </a:fld>
             <a:endParaRPr lang="en-US" dirty="0"/>
           </a:p>
@@ -3453,7 +3453,6 @@
               <a:rPr lang="da-DK" dirty="0" smtClean="0"/>
               <a:t>E3PRJ3, gruppe 3</a:t>
             </a:r>
-            <a:endParaRPr lang="da-DK" dirty="0" smtClean="0"/>
           </a:p>
           <a:p>
             <a:r>
@@ -3464,11 +3463,7 @@
           <a:p>
             <a:r>
               <a:rPr lang="da-DK" dirty="0" smtClean="0"/>
-              <a:t>22</a:t>
-            </a:r>
-            <a:r>
-              <a:rPr lang="da-DK" dirty="0" smtClean="0"/>
-              <a:t>-06-2016</a:t>
+              <a:t>22-06-2016</a:t>
             </a:r>
             <a:endParaRPr lang="da-DK" dirty="0"/>
           </a:p>
@@ -3690,33 +3685,285 @@
           </a:p>
         </p:txBody>
       </p:sp>
-      <p:sp>
-        <p:nvSpPr>
-          <p:cNvPr id="6" name="Pladsholder til tekst 5"/>
-          <p:cNvSpPr>
-            <a:spLocks noGrp="1"/>
-          </p:cNvSpPr>
-          <p:nvPr>
-            <p:ph type="body" sz="half" idx="2"/>
-          </p:nvPr>
-        </p:nvSpPr>
-        <p:spPr/>
-        <p:txBody>
-          <a:bodyPr/>
-          <a:lstStyle/>
-          <a:p>
-            <a:r>
-              <a:rPr lang="da-DK" dirty="0" smtClean="0"/>
-              <a:t>Tennas slide</a:t>
-            </a:r>
-            <a:endParaRPr lang="da-DK" dirty="0"/>
-          </a:p>
-        </p:txBody>
-      </p:sp>
+      <p:pic>
+        <p:nvPicPr>
+          <p:cNvPr id="9" name="Picture 4"/>
+          <p:cNvPicPr>
+            <a:picLocks noChangeAspect="1"/>
+          </p:cNvPicPr>
+          <p:nvPr/>
+        </p:nvPicPr>
+        <p:blipFill>
+          <a:blip r:embed="rId2"/>
+          <a:stretch>
+            <a:fillRect/>
+          </a:stretch>
+        </p:blipFill>
+        <p:spPr>
+          <a:xfrm>
+            <a:off x="248661" y="3106300"/>
+            <a:ext cx="2302210" cy="2096763"/>
+          </a:xfrm>
+          <a:prstGeom prst="rect">
+            <a:avLst/>
+          </a:prstGeom>
+          <a:ln>
+            <a:noFill/>
+          </a:ln>
+          <a:effectLst>
+            <a:outerShdw blurRad="50800" dist="38100" algn="l" rotWithShape="0">
+              <a:prstClr val="black">
+                <a:alpha val="40000"/>
+              </a:prstClr>
+            </a:outerShdw>
+          </a:effectLst>
+        </p:spPr>
+      </p:pic>
+      <p:pic>
+        <p:nvPicPr>
+          <p:cNvPr id="1026" name="Picture 2" descr="https://cdn1.iconfinder.com/data/icons/agile/500/agile_standup_meeting-512.png"/>
+          <p:cNvPicPr>
+            <a:picLocks noChangeAspect="1" noChangeArrowheads="1"/>
+          </p:cNvPicPr>
+          <p:nvPr/>
+        </p:nvPicPr>
+        <p:blipFill>
+          <a:blip r:embed="rId3">
+            <a:extLst>
+              <a:ext uri="{28A0092B-C50C-407E-A947-70E740481C1C}">
+                <a14:useLocalDpi xmlns:a14="http://schemas.microsoft.com/office/drawing/2010/main" val="0"/>
+              </a:ext>
+            </a:extLst>
+          </a:blip>
+          <a:srcRect/>
+          <a:stretch>
+            <a:fillRect/>
+          </a:stretch>
+        </p:blipFill>
+        <p:spPr bwMode="auto">
+          <a:xfrm>
+            <a:off x="2719746" y="4200818"/>
+            <a:ext cx="2032560" cy="2032560"/>
+          </a:xfrm>
+          <a:prstGeom prst="rect">
+            <a:avLst/>
+          </a:prstGeom>
+          <a:ln>
+            <a:noFill/>
+          </a:ln>
+          <a:effectLst>
+            <a:outerShdw blurRad="292100" dist="139700" dir="2700000" algn="tl" rotWithShape="0">
+              <a:srgbClr val="333333">
+                <a:alpha val="65000"/>
+              </a:srgbClr>
+            </a:outerShdw>
+          </a:effectLst>
+          <a:extLst>
+            <a:ext uri="{909E8E84-426E-40DD-AFC4-6F175D3DCCD1}">
+              <a14:hiddenFill xmlns:a14="http://schemas.microsoft.com/office/drawing/2010/main">
+                <a:solidFill>
+                  <a:srgbClr val="FFFFFF"/>
+                </a:solidFill>
+              </a14:hiddenFill>
+            </a:ext>
+          </a:extLst>
+        </p:spPr>
+      </p:pic>
+      <p:pic>
+        <p:nvPicPr>
+          <p:cNvPr id="13" name="Billede 12"/>
+          <p:cNvPicPr>
+            <a:picLocks noChangeAspect="1"/>
+          </p:cNvPicPr>
+          <p:nvPr/>
+        </p:nvPicPr>
+        <p:blipFill rotWithShape="1">
+          <a:blip r:embed="rId4">
+            <a:extLst>
+              <a:ext uri="{28A0092B-C50C-407E-A947-70E740481C1C}">
+                <a14:useLocalDpi xmlns:a14="http://schemas.microsoft.com/office/drawing/2010/main" val="0"/>
+              </a:ext>
+            </a:extLst>
+          </a:blip>
+          <a:srcRect r="9507" b="10398"/>
+          <a:stretch/>
+        </p:blipFill>
+        <p:spPr>
+          <a:xfrm>
+            <a:off x="6473783" y="296884"/>
+            <a:ext cx="5369598" cy="3541019"/>
+          </a:xfrm>
+          <a:prstGeom prst="rect">
+            <a:avLst/>
+          </a:prstGeom>
+          <a:ln>
+            <a:noFill/>
+          </a:ln>
+          <a:effectLst>
+            <a:outerShdw blurRad="292100" dist="139700" dir="2700000" algn="tl" rotWithShape="0">
+              <a:srgbClr val="333333">
+                <a:alpha val="65000"/>
+              </a:srgbClr>
+            </a:outerShdw>
+          </a:effectLst>
+        </p:spPr>
+      </p:pic>
+      <p:pic>
+        <p:nvPicPr>
+          <p:cNvPr id="14" name="Billede 13"/>
+          <p:cNvPicPr>
+            <a:picLocks noChangeAspect="1"/>
+          </p:cNvPicPr>
+          <p:nvPr/>
+        </p:nvPicPr>
+        <p:blipFill>
+          <a:blip r:embed="rId5"/>
+          <a:stretch>
+            <a:fillRect/>
+          </a:stretch>
+        </p:blipFill>
+        <p:spPr>
+          <a:xfrm>
+            <a:off x="242754" y="296215"/>
+            <a:ext cx="4110306" cy="2496991"/>
+          </a:xfrm>
+          <a:prstGeom prst="rect">
+            <a:avLst/>
+          </a:prstGeom>
+          <a:ln>
+            <a:noFill/>
+          </a:ln>
+          <a:effectLst>
+            <a:outerShdw blurRad="292100" dist="139700" dir="2700000" algn="tl" rotWithShape="0">
+              <a:srgbClr val="333333">
+                <a:alpha val="65000"/>
+              </a:srgbClr>
+            </a:outerShdw>
+          </a:effectLst>
+        </p:spPr>
+      </p:pic>
+      <p:pic>
+        <p:nvPicPr>
+          <p:cNvPr id="16" name="Picture 3"/>
+          <p:cNvPicPr>
+            <a:picLocks noChangeAspect="1"/>
+          </p:cNvPicPr>
+          <p:nvPr/>
+        </p:nvPicPr>
+        <p:blipFill>
+          <a:blip r:embed="rId6"/>
+          <a:stretch>
+            <a:fillRect/>
+          </a:stretch>
+        </p:blipFill>
+        <p:spPr>
+          <a:xfrm>
+            <a:off x="4920348" y="3126023"/>
+            <a:ext cx="2468415" cy="2605074"/>
+          </a:xfrm>
+          <a:prstGeom prst="rect">
+            <a:avLst/>
+          </a:prstGeom>
+          <a:ln>
+            <a:noFill/>
+          </a:ln>
+          <a:effectLst>
+            <a:outerShdw blurRad="292100" dist="139700" dir="2700000" algn="tl" rotWithShape="0">
+              <a:srgbClr val="333333">
+                <a:alpha val="65000"/>
+              </a:srgbClr>
+            </a:outerShdw>
+          </a:effectLst>
+        </p:spPr>
+      </p:pic>
+      <p:pic>
+        <p:nvPicPr>
+          <p:cNvPr id="15" name="Billede 14"/>
+          <p:cNvPicPr>
+            <a:picLocks noChangeAspect="1"/>
+          </p:cNvPicPr>
+          <p:nvPr/>
+        </p:nvPicPr>
+        <p:blipFill>
+          <a:blip r:embed="rId7"/>
+          <a:stretch>
+            <a:fillRect/>
+          </a:stretch>
+        </p:blipFill>
+        <p:spPr>
+          <a:xfrm>
+            <a:off x="7688687" y="4094744"/>
+            <a:ext cx="4157528" cy="2468276"/>
+          </a:xfrm>
+          <a:prstGeom prst="rect">
+            <a:avLst/>
+          </a:prstGeom>
+          <a:ln>
+            <a:noFill/>
+          </a:ln>
+          <a:effectLst>
+            <a:outerShdw blurRad="292100" dist="139700" dir="2700000" algn="tl" rotWithShape="0">
+              <a:srgbClr val="333333">
+                <a:alpha val="65000"/>
+              </a:srgbClr>
+            </a:outerShdw>
+          </a:effectLst>
+        </p:spPr>
+      </p:pic>
+      <p:pic>
+        <p:nvPicPr>
+          <p:cNvPr id="1030" name="Picture 6" descr="https://media.licdn.com/mpr/mpr/shrink_200_200/AAEAAQAAAAAAAAaiAAAAJGY4NGRmMDhmLTBkNWMtNDE5ZC1iNTljLWNiOWVlOWNjOWVmNA.png"/>
+          <p:cNvPicPr>
+            <a:picLocks noChangeAspect="1" noChangeArrowheads="1"/>
+          </p:cNvPicPr>
+          <p:nvPr/>
+        </p:nvPicPr>
+        <p:blipFill>
+          <a:blip r:embed="rId8">
+            <a:extLst>
+              <a:ext uri="{28A0092B-C50C-407E-A947-70E740481C1C}">
+                <a14:useLocalDpi xmlns:a14="http://schemas.microsoft.com/office/drawing/2010/main" val="0"/>
+              </a:ext>
+            </a:extLst>
+          </a:blip>
+          <a:srcRect/>
+          <a:stretch>
+            <a:fillRect/>
+          </a:stretch>
+        </p:blipFill>
+        <p:spPr bwMode="auto">
+          <a:xfrm>
+            <a:off x="5204094" y="450761"/>
+            <a:ext cx="1622738" cy="1622738"/>
+          </a:xfrm>
+          <a:prstGeom prst="rect">
+            <a:avLst/>
+          </a:prstGeom>
+          <a:ln>
+            <a:noFill/>
+          </a:ln>
+          <a:effectLst>
+            <a:outerShdw blurRad="292100" dist="139700" dir="2700000" algn="tl" rotWithShape="0">
+              <a:srgbClr val="333333">
+                <a:alpha val="65000"/>
+              </a:srgbClr>
+            </a:outerShdw>
+          </a:effectLst>
+          <a:extLst>
+            <a:ext uri="{909E8E84-426E-40DD-AFC4-6F175D3DCCD1}">
+              <a14:hiddenFill xmlns:a14="http://schemas.microsoft.com/office/drawing/2010/main">
+                <a:solidFill>
+                  <a:srgbClr val="FFFFFF"/>
+                </a:solidFill>
+              </a14:hiddenFill>
+            </a:ext>
+          </a:extLst>
+        </p:spPr>
+      </p:pic>
     </p:spTree>
     <p:extLst>
       <p:ext uri="{BB962C8B-B14F-4D97-AF65-F5344CB8AC3E}">
-        <p14:creationId xmlns:p14="http://schemas.microsoft.com/office/powerpoint/2010/main" val="430674989"/>
+        <p14:creationId xmlns:p14="http://schemas.microsoft.com/office/powerpoint/2010/main" val="342076141"/>
       </p:ext>
     </p:extLst>
   </p:cSld>

</xml_diff>

<commit_message>
Changes to Sprint slide of presentation powerpoint
</commit_message>
<xml_diff>
--- a/Præsentation/Fremlæggelse.pptx
+++ b/Præsentation/Fremlæggelse.pptx
@@ -3642,6 +3642,13 @@
   <p:clrMapOvr>
     <a:masterClrMapping/>
   </p:clrMapOvr>
+  <p:timing>
+    <p:tnLst>
+      <p:par>
+        <p:cTn id="1" dur="indefinite" restart="never" nodeType="tmRoot"/>
+      </p:par>
+    </p:tnLst>
+  </p:timing>
 </p:sld>
 </file>
 
@@ -3742,7 +3749,7 @@
         </p:blipFill>
         <p:spPr bwMode="auto">
           <a:xfrm>
-            <a:off x="2719746" y="4200818"/>
+            <a:off x="2745505" y="4638704"/>
             <a:ext cx="2032560" cy="2032560"/>
           </a:xfrm>
           <a:prstGeom prst="rect">
@@ -3785,13 +3792,13 @@
               </a:ext>
             </a:extLst>
           </a:blip>
-          <a:srcRect r="9507" b="10398"/>
+          <a:srcRect r="2475" b="19849"/>
           <a:stretch/>
         </p:blipFill>
         <p:spPr>
           <a:xfrm>
-            <a:off x="6473783" y="296884"/>
-            <a:ext cx="5369598" cy="3541019"/>
+            <a:off x="5563673" y="348399"/>
+            <a:ext cx="6272011" cy="3433062"/>
           </a:xfrm>
           <a:prstGeom prst="rect">
             <a:avLst/>
@@ -3858,8 +3865,8 @@
         </p:blipFill>
         <p:spPr>
           <a:xfrm>
-            <a:off x="4920348" y="3126023"/>
-            <a:ext cx="2468415" cy="2605074"/>
+            <a:off x="5060717" y="4108360"/>
+            <a:ext cx="2343027" cy="2472744"/>
           </a:xfrm>
           <a:prstGeom prst="rect">
             <a:avLst/>
@@ -3933,8 +3940,8 @@
         </p:blipFill>
         <p:spPr bwMode="auto">
           <a:xfrm>
-            <a:off x="5204094" y="450761"/>
-            <a:ext cx="1622738" cy="1622738"/>
+            <a:off x="4740451" y="643944"/>
+            <a:ext cx="1275009" cy="1275009"/>
           </a:xfrm>
           <a:prstGeom prst="rect">
             <a:avLst/>
@@ -3960,6 +3967,71 @@
           </a:extLst>
         </p:spPr>
       </p:pic>
+      <p:sp>
+        <p:nvSpPr>
+          <p:cNvPr id="21" name="Pladsholder til tekst 5"/>
+          <p:cNvSpPr>
+            <a:spLocks noGrp="1"/>
+          </p:cNvSpPr>
+          <p:nvPr>
+            <p:ph type="body" sz="half" idx="2"/>
+          </p:nvPr>
+        </p:nvSpPr>
+        <p:spPr>
+          <a:xfrm>
+            <a:off x="2685760" y="3115018"/>
+            <a:ext cx="2723367" cy="1482740"/>
+          </a:xfrm>
+        </p:spPr>
+        <p:txBody>
+          <a:bodyPr>
+            <a:normAutofit/>
+          </a:bodyPr>
+          <a:lstStyle/>
+          <a:p>
+            <a:r>
+              <a:rPr lang="da-DK" dirty="0" err="1" smtClean="0"/>
+              <a:t>Scrummaster</a:t>
+            </a:r>
+            <a:r>
+              <a:rPr lang="da-DK" dirty="0" smtClean="0"/>
+              <a:t>:</a:t>
+            </a:r>
+            <a:endParaRPr lang="da-DK" dirty="0"/>
+          </a:p>
+          <a:p>
+            <a:r>
+              <a:rPr lang="da-DK" dirty="0" smtClean="0"/>
+              <a:t>Sprint 1 – Kasper Rieder</a:t>
+            </a:r>
+            <a:r>
+              <a:rPr lang="da-DK" dirty="0"/>
+              <a:t/>
+            </a:r>
+            <a:br>
+              <a:rPr lang="da-DK" dirty="0"/>
+            </a:br>
+            <a:r>
+              <a:rPr lang="da-DK" dirty="0" smtClean="0"/>
+              <a:t>Sprint 2 – Pernille Kjeldgaard</a:t>
+            </a:r>
+            <a:br>
+              <a:rPr lang="da-DK" dirty="0" smtClean="0"/>
+            </a:br>
+            <a:r>
+              <a:rPr lang="da-DK" dirty="0" smtClean="0"/>
+              <a:t>Sprint 3 – Mia Konstmann</a:t>
+            </a:r>
+            <a:br>
+              <a:rPr lang="da-DK" dirty="0" smtClean="0"/>
+            </a:br>
+            <a:r>
+              <a:rPr lang="da-DK" dirty="0" smtClean="0"/>
+              <a:t>Sprint 4 – Tenna Rasmussen </a:t>
+            </a:r>
+          </a:p>
+        </p:txBody>
+      </p:sp>
     </p:spTree>
     <p:extLst>
       <p:ext uri="{BB962C8B-B14F-4D97-AF65-F5344CB8AC3E}">
@@ -3970,6 +4042,13 @@
   <p:clrMapOvr>
     <a:masterClrMapping/>
   </p:clrMapOvr>
+  <p:timing>
+    <p:tnLst>
+      <p:par>
+        <p:cTn id="1" dur="indefinite" restart="never" nodeType="tmRoot"/>
+      </p:par>
+    </p:tnLst>
+  </p:timing>
 </p:sld>
 </file>
 
@@ -4046,6 +4125,13 @@
   <p:clrMapOvr>
     <a:masterClrMapping/>
   </p:clrMapOvr>
+  <p:timing>
+    <p:tnLst>
+      <p:par>
+        <p:cTn id="1" dur="indefinite" restart="never" nodeType="tmRoot"/>
+      </p:par>
+    </p:tnLst>
+  </p:timing>
 </p:sld>
 </file>
 

</xml_diff>

<commit_message>
fik gjord min del færdig til fremlæggelsen
</commit_message>
<xml_diff>
--- a/Præsentation/Fremlæggelse.pptx
+++ b/Præsentation/Fremlæggelse.pptx
@@ -319,7 +319,7 @@
           <a:p>
             <a:fld id="{6AD6EE87-EBD5-4F12-A48A-63ACA297AC8F}" type="datetimeFigureOut">
               <a:rPr lang="en-US" smtClean="0"/>
-              <a:t>6/1/2016</a:t>
+              <a:t>6/20/2016</a:t>
             </a:fld>
             <a:endParaRPr lang="en-US" dirty="0"/>
           </a:p>
@@ -509,7 +509,7 @@
           <a:p>
             <a:fld id="{4CD73815-2707-4475-8F1A-B873CB631BB4}" type="datetimeFigureOut">
               <a:rPr lang="en-US" smtClean="0"/>
-              <a:t>6/1/2016</a:t>
+              <a:t>6/20/2016</a:t>
             </a:fld>
             <a:endParaRPr lang="en-US" dirty="0"/>
           </a:p>
@@ -689,7 +689,7 @@
           <a:p>
             <a:fld id="{2A4AFB99-0EAB-4182-AFF8-E214C82A68F6}" type="datetimeFigureOut">
               <a:rPr lang="en-US" smtClean="0"/>
-              <a:t>6/1/2016</a:t>
+              <a:t>6/20/2016</a:t>
             </a:fld>
             <a:endParaRPr lang="en-US" dirty="0"/>
           </a:p>
@@ -859,7 +859,7 @@
           <a:p>
             <a:fld id="{A5D3794B-289A-4A80-97D7-111025398D45}" type="datetimeFigureOut">
               <a:rPr lang="en-US" smtClean="0"/>
-              <a:t>6/1/2016</a:t>
+              <a:t>6/20/2016</a:t>
             </a:fld>
             <a:endParaRPr lang="en-US" dirty="0"/>
           </a:p>
@@ -1115,7 +1115,7 @@
           <a:p>
             <a:fld id="{5A61015F-7CC6-4D0A-9D87-873EA4C304CC}" type="datetimeFigureOut">
               <a:rPr lang="en-US" smtClean="0"/>
-              <a:t>6/1/2016</a:t>
+              <a:t>6/20/2016</a:t>
             </a:fld>
             <a:endParaRPr lang="en-US" dirty="0"/>
           </a:p>
@@ -1403,7 +1403,7 @@
           <a:p>
             <a:fld id="{93C6A301-0538-44EC-B09D-202E1042A48B}" type="datetimeFigureOut">
               <a:rPr lang="en-US" smtClean="0"/>
-              <a:t>6/1/2016</a:t>
+              <a:t>6/20/2016</a:t>
             </a:fld>
             <a:endParaRPr lang="en-US" dirty="0"/>
           </a:p>
@@ -1841,7 +1841,7 @@
           <a:p>
             <a:fld id="{D789574A-8875-45EF-8EA2-3CAA0F7ABC4C}" type="datetimeFigureOut">
               <a:rPr lang="en-US" smtClean="0"/>
-              <a:t>6/1/2016</a:t>
+              <a:t>6/20/2016</a:t>
             </a:fld>
             <a:endParaRPr lang="en-US" dirty="0"/>
           </a:p>
@@ -1959,7 +1959,7 @@
           <a:p>
             <a:fld id="{67EF4D4C-5367-4C26-9E2B-D8088D7FCA81}" type="datetimeFigureOut">
               <a:rPr lang="en-US" smtClean="0"/>
-              <a:t>6/1/2016</a:t>
+              <a:t>6/20/2016</a:t>
             </a:fld>
             <a:endParaRPr lang="en-US" dirty="0"/>
           </a:p>
@@ -2054,7 +2054,7 @@
           <a:p>
             <a:fld id="{56E91E96-98B0-4413-9547-46F3504108EF}" type="datetimeFigureOut">
               <a:rPr lang="en-US" smtClean="0"/>
-              <a:t>6/1/2016</a:t>
+              <a:t>6/20/2016</a:t>
             </a:fld>
             <a:endParaRPr lang="en-US" dirty="0"/>
           </a:p>
@@ -2410,7 +2410,7 @@
           <a:p>
             <a:fld id="{05C68B11-C5A8-448C-8CE9-B1A273C79CFC}" type="datetimeFigureOut">
               <a:rPr lang="en-US" smtClean="0"/>
-              <a:t>6/1/2016</a:t>
+              <a:t>6/20/2016</a:t>
             </a:fld>
             <a:endParaRPr lang="en-US" dirty="0"/>
           </a:p>
@@ -2726,7 +2726,7 @@
           <a:p>
             <a:fld id="{C7616CA0-919D-4A49-9C8A-62FDFB3A5183}" type="datetimeFigureOut">
               <a:rPr lang="en-US" smtClean="0"/>
-              <a:t>6/1/2016</a:t>
+              <a:t>6/20/2016</a:t>
             </a:fld>
             <a:endParaRPr lang="en-US" dirty="0"/>
           </a:p>
@@ -2960,7 +2960,7 @@
             <a:fld id="{90298CD5-6C1E-4009-B41F-6DF62E31D3BE}" type="datetimeFigureOut">
               <a:rPr lang="en-US" smtClean="0"/>
               <a:pPr/>
-              <a:t>6/1/2016</a:t>
+              <a:t>6/20/2016</a:t>
             </a:fld>
             <a:endParaRPr lang="en-US" dirty="0"/>
           </a:p>
@@ -3546,9 +3546,112 @@
           <a:p>
             <a:r>
               <a:rPr lang="da-DK" dirty="0" smtClean="0"/>
-              <a:t>Mikkels slide</a:t>
+              <a:t>Mikkels </a:t>
+            </a:r>
+            <a:r>
+              <a:rPr lang="da-DK" dirty="0" smtClean="0"/>
+              <a:t>slide </a:t>
             </a:r>
             <a:endParaRPr lang="da-DK" dirty="0"/>
+          </a:p>
+        </p:txBody>
+      </p:sp>
+      <p:sp>
+        <p:nvSpPr>
+          <p:cNvPr id="5" name="Tekstfelt 4"/>
+          <p:cNvSpPr txBox="1"/>
+          <p:nvPr/>
+        </p:nvSpPr>
+        <p:spPr>
+          <a:xfrm>
+            <a:off x="676656" y="1163003"/>
+            <a:ext cx="6886575" cy="2400657"/>
+          </a:xfrm>
+          <a:prstGeom prst="rect">
+            <a:avLst/>
+          </a:prstGeom>
+          <a:noFill/>
+        </p:spPr>
+        <p:txBody>
+          <a:bodyPr wrap="square" rtlCol="0">
+            <a:spAutoFit/>
+          </a:bodyPr>
+          <a:lstStyle/>
+          <a:p>
+            <a:pPr marL="285750" indent="-285750">
+              <a:lnSpc>
+                <a:spcPct val="250000"/>
+              </a:lnSpc>
+              <a:buFont typeface="Arial" panose="020B0604020202020204" pitchFamily="34" charset="0"/>
+              <a:buChar char="•"/>
+            </a:pPr>
+            <a:r>
+              <a:rPr lang="da-DK" sz="2000" dirty="0" smtClean="0">
+                <a:ln w="0"/>
+                <a:effectLst>
+                  <a:outerShdw blurRad="38100" dist="19050" dir="2700000" algn="tl" rotWithShape="0">
+                    <a:schemeClr val="dk1">
+                      <a:alpha val="40000"/>
+                    </a:schemeClr>
+                  </a:outerShdw>
+                </a:effectLst>
+              </a:rPr>
+              <a:t>Valg af projekt</a:t>
+            </a:r>
+          </a:p>
+          <a:p>
+            <a:pPr marL="285750" indent="-285750">
+              <a:lnSpc>
+                <a:spcPct val="250000"/>
+              </a:lnSpc>
+              <a:buFont typeface="Arial" panose="020B0604020202020204" pitchFamily="34" charset="0"/>
+              <a:buChar char="•"/>
+            </a:pPr>
+            <a:r>
+              <a:rPr lang="da-DK" sz="2000" dirty="0" smtClean="0">
+                <a:ln w="0"/>
+                <a:effectLst>
+                  <a:outerShdw blurRad="38100" dist="19050" dir="2700000" algn="tl" rotWithShape="0">
+                    <a:schemeClr val="dk1">
+                      <a:alpha val="40000"/>
+                    </a:schemeClr>
+                  </a:outerShdw>
+                </a:effectLst>
+              </a:rPr>
+              <a:t>Krav til projektet</a:t>
+            </a:r>
+          </a:p>
+          <a:p>
+            <a:pPr marL="285750" indent="-285750">
+              <a:lnSpc>
+                <a:spcPct val="250000"/>
+              </a:lnSpc>
+              <a:buFont typeface="Arial" panose="020B0604020202020204" pitchFamily="34" charset="0"/>
+              <a:buChar char="•"/>
+            </a:pPr>
+            <a:r>
+              <a:rPr lang="da-DK" sz="2000" dirty="0" smtClean="0">
+                <a:ln w="0"/>
+                <a:effectLst>
+                  <a:outerShdw blurRad="38100" dist="19050" dir="2700000" algn="tl" rotWithShape="0">
+                    <a:schemeClr val="dk1">
+                      <a:alpha val="40000"/>
+                    </a:schemeClr>
+                  </a:outerShdw>
+                </a:effectLst>
+              </a:rPr>
+              <a:t>Opdeling af arbejde </a:t>
+            </a:r>
+            <a:endParaRPr lang="da-DK" sz="2000" dirty="0">
+              <a:ln w="0"/>
+              <a:effectLst>
+                <a:outerShdw blurRad="38100" dist="19050" dir="2700000" algn="tl" rotWithShape="0">
+                  <a:schemeClr val="dk1">
+                    <a:alpha val="40000"/>
+                  </a:schemeClr>
+                </a:outerShdw>
+              </a:effectLst>
+            </a:endParaRPr>
           </a:p>
         </p:txBody>
       </p:sp>

</xml_diff>